<commit_message>
Fixed issue with help file not working due to different theme
</commit_message>
<xml_diff>
--- a/Docs/Shiny_code_layout.pptx
+++ b/Docs/Shiny_code_layout.pptx
@@ -116,13 +116,37 @@
 <file path=ppt/revisionInfo.xml><?xml version="1.0" encoding="utf-8"?>
 <p1510:revInfo xmlns:a="http://schemas.openxmlformats.org/drawingml/2006/main" xmlns:r="http://schemas.openxmlformats.org/officeDocument/2006/relationships" xmlns:p1510="http://schemas.microsoft.com/office/powerpoint/2015/10/main">
   <p1510:revLst>
-    <p1510:client id="{7F9CDFF2-12CC-49BE-BADF-E215369AA252}" v="17" dt="2019-04-09T13:46:55.865"/>
+    <p1510:client id="{09A41CA2-EE95-47A3-B1B5-56E89E2BAE71}" v="2" dt="2019-06-05T13:19:28.639"/>
   </p1510:revLst>
 </p1510:revInfo>
 </file>
 
 <file path=ppt/changesInfos/changesInfo1.xml><?xml version="1.0" encoding="utf-8"?>
 <pc:chgInfo xmlns:a="http://schemas.openxmlformats.org/drawingml/2006/main" xmlns:r="http://schemas.openxmlformats.org/officeDocument/2006/relationships" xmlns:ac="http://schemas.microsoft.com/office/drawing/2013/main/command" xmlns:pc="http://schemas.microsoft.com/office/powerpoint/2013/main/command">
+  <pc:docChgLst>
+    <pc:chgData name="Steven Bachman" userId="f1bd7b3f-e3db-4092-8e94-385b7efc1dd1" providerId="ADAL" clId="{09A41CA2-EE95-47A3-B1B5-56E89E2BAE71}"/>
+    <pc:docChg chg="custSel modSld">
+      <pc:chgData name="Steven Bachman" userId="f1bd7b3f-e3db-4092-8e94-385b7efc1dd1" providerId="ADAL" clId="{09A41CA2-EE95-47A3-B1B5-56E89E2BAE71}" dt="2019-06-05T13:23:08.943" v="481" actId="20577"/>
+      <pc:docMkLst>
+        <pc:docMk/>
+      </pc:docMkLst>
+      <pc:sldChg chg="addSp modSp">
+        <pc:chgData name="Steven Bachman" userId="f1bd7b3f-e3db-4092-8e94-385b7efc1dd1" providerId="ADAL" clId="{09A41CA2-EE95-47A3-B1B5-56E89E2BAE71}" dt="2019-06-05T13:23:08.943" v="481" actId="20577"/>
+        <pc:sldMkLst>
+          <pc:docMk/>
+          <pc:sldMk cId="3659917783" sldId="257"/>
+        </pc:sldMkLst>
+        <pc:spChg chg="add mod">
+          <ac:chgData name="Steven Bachman" userId="f1bd7b3f-e3db-4092-8e94-385b7efc1dd1" providerId="ADAL" clId="{09A41CA2-EE95-47A3-B1B5-56E89E2BAE71}" dt="2019-06-05T13:23:08.943" v="481" actId="20577"/>
+          <ac:spMkLst>
+            <pc:docMk/>
+            <pc:sldMk cId="3659917783" sldId="257"/>
+            <ac:spMk id="2" creationId="{31396847-F172-4F37-B018-A37DD1686129}"/>
+          </ac:spMkLst>
+        </pc:spChg>
+      </pc:sldChg>
+    </pc:docChg>
+  </pc:docChgLst>
   <pc:docChgLst>
     <pc:chgData name="Steven Bachman" userId="f1bd7b3f-e3db-4092-8e94-385b7efc1dd1" providerId="ADAL" clId="{7F9CDFF2-12CC-49BE-BADF-E215369AA252}"/>
     <pc:docChg chg="custSel addSld modSld">
@@ -434,7 +458,7 @@
           <a:p>
             <a:fld id="{26C69B18-323B-49C2-A22B-305B2C39A9B1}" type="datetimeFigureOut">
               <a:rPr lang="en-GB" smtClean="0"/>
-              <a:t>09/04/2019</a:t>
+              <a:t>05/06/2019</a:t>
             </a:fld>
             <a:endParaRPr lang="en-GB"/>
           </a:p>
@@ -634,7 +658,7 @@
           <a:p>
             <a:fld id="{26C69B18-323B-49C2-A22B-305B2C39A9B1}" type="datetimeFigureOut">
               <a:rPr lang="en-GB" smtClean="0"/>
-              <a:t>09/04/2019</a:t>
+              <a:t>05/06/2019</a:t>
             </a:fld>
             <a:endParaRPr lang="en-GB"/>
           </a:p>
@@ -844,7 +868,7 @@
           <a:p>
             <a:fld id="{26C69B18-323B-49C2-A22B-305B2C39A9B1}" type="datetimeFigureOut">
               <a:rPr lang="en-GB" smtClean="0"/>
-              <a:t>09/04/2019</a:t>
+              <a:t>05/06/2019</a:t>
             </a:fld>
             <a:endParaRPr lang="en-GB"/>
           </a:p>
@@ -1044,7 +1068,7 @@
           <a:p>
             <a:fld id="{26C69B18-323B-49C2-A22B-305B2C39A9B1}" type="datetimeFigureOut">
               <a:rPr lang="en-GB" smtClean="0"/>
-              <a:t>09/04/2019</a:t>
+              <a:t>05/06/2019</a:t>
             </a:fld>
             <a:endParaRPr lang="en-GB"/>
           </a:p>
@@ -1320,7 +1344,7 @@
           <a:p>
             <a:fld id="{26C69B18-323B-49C2-A22B-305B2C39A9B1}" type="datetimeFigureOut">
               <a:rPr lang="en-GB" smtClean="0"/>
-              <a:t>09/04/2019</a:t>
+              <a:t>05/06/2019</a:t>
             </a:fld>
             <a:endParaRPr lang="en-GB"/>
           </a:p>
@@ -1588,7 +1612,7 @@
           <a:p>
             <a:fld id="{26C69B18-323B-49C2-A22B-305B2C39A9B1}" type="datetimeFigureOut">
               <a:rPr lang="en-GB" smtClean="0"/>
-              <a:t>09/04/2019</a:t>
+              <a:t>05/06/2019</a:t>
             </a:fld>
             <a:endParaRPr lang="en-GB"/>
           </a:p>
@@ -2003,7 +2027,7 @@
           <a:p>
             <a:fld id="{26C69B18-323B-49C2-A22B-305B2C39A9B1}" type="datetimeFigureOut">
               <a:rPr lang="en-GB" smtClean="0"/>
-              <a:t>09/04/2019</a:t>
+              <a:t>05/06/2019</a:t>
             </a:fld>
             <a:endParaRPr lang="en-GB"/>
           </a:p>
@@ -2145,7 +2169,7 @@
           <a:p>
             <a:fld id="{26C69B18-323B-49C2-A22B-305B2C39A9B1}" type="datetimeFigureOut">
               <a:rPr lang="en-GB" smtClean="0"/>
-              <a:t>09/04/2019</a:t>
+              <a:t>05/06/2019</a:t>
             </a:fld>
             <a:endParaRPr lang="en-GB"/>
           </a:p>
@@ -2258,7 +2282,7 @@
           <a:p>
             <a:fld id="{26C69B18-323B-49C2-A22B-305B2C39A9B1}" type="datetimeFigureOut">
               <a:rPr lang="en-GB" smtClean="0"/>
-              <a:t>09/04/2019</a:t>
+              <a:t>05/06/2019</a:t>
             </a:fld>
             <a:endParaRPr lang="en-GB"/>
           </a:p>
@@ -2571,7 +2595,7 @@
           <a:p>
             <a:fld id="{26C69B18-323B-49C2-A22B-305B2C39A9B1}" type="datetimeFigureOut">
               <a:rPr lang="en-GB" smtClean="0"/>
-              <a:t>09/04/2019</a:t>
+              <a:t>05/06/2019</a:t>
             </a:fld>
             <a:endParaRPr lang="en-GB"/>
           </a:p>
@@ -2860,7 +2884,7 @@
           <a:p>
             <a:fld id="{26C69B18-323B-49C2-A22B-305B2C39A9B1}" type="datetimeFigureOut">
               <a:rPr lang="en-GB" smtClean="0"/>
-              <a:t>09/04/2019</a:t>
+              <a:t>05/06/2019</a:t>
             </a:fld>
             <a:endParaRPr lang="en-GB"/>
           </a:p>
@@ -3103,7 +3127,7 @@
           <a:p>
             <a:fld id="{26C69B18-323B-49C2-A22B-305B2C39A9B1}" type="datetimeFigureOut">
               <a:rPr lang="en-GB" smtClean="0"/>
-              <a:t>09/04/2019</a:t>
+              <a:t>05/06/2019</a:t>
             </a:fld>
             <a:endParaRPr lang="en-GB"/>
           </a:p>
@@ -4102,6 +4126,103 @@
           <a:chExt cx="0" cy="0"/>
         </a:xfrm>
       </p:grpSpPr>
+      <p:sp>
+        <p:nvSpPr>
+          <p:cNvPr id="2" name="TextBox 1">
+            <a:extLst>
+              <a:ext uri="{FF2B5EF4-FFF2-40B4-BE49-F238E27FC236}">
+                <a16:creationId xmlns:a16="http://schemas.microsoft.com/office/drawing/2014/main" id="{31396847-F172-4F37-B018-A37DD1686129}"/>
+              </a:ext>
+            </a:extLst>
+          </p:cNvPr>
+          <p:cNvSpPr txBox="1"/>
+          <p:nvPr/>
+        </p:nvSpPr>
+        <p:spPr>
+          <a:xfrm>
+            <a:off x="850900" y="647700"/>
+            <a:ext cx="10769600" cy="3231654"/>
+          </a:xfrm>
+          <a:prstGeom prst="rect">
+            <a:avLst/>
+          </a:prstGeom>
+          <a:noFill/>
+        </p:spPr>
+        <p:txBody>
+          <a:bodyPr wrap="square" rtlCol="0">
+            <a:spAutoFit/>
+          </a:bodyPr>
+          <a:lstStyle/>
+          <a:p>
+            <a:r>
+              <a:rPr lang="en-GB" sz="2400" b="1" dirty="0"/>
+              <a:t>Name matching – what does </a:t>
+            </a:r>
+            <a:r>
+              <a:rPr lang="en-GB" sz="2400" b="1" dirty="0" err="1"/>
+              <a:t>RapidLC</a:t>
+            </a:r>
+            <a:r>
+              <a:rPr lang="en-GB" sz="2400" b="1" dirty="0"/>
+              <a:t> do?</a:t>
+            </a:r>
+          </a:p>
+          <a:p>
+            <a:endParaRPr lang="en-GB" dirty="0"/>
+          </a:p>
+          <a:p>
+            <a:r>
+              <a:rPr lang="en-GB" dirty="0"/>
+              <a:t>1. User submits binomial e.g. </a:t>
+            </a:r>
+            <a:r>
+              <a:rPr lang="en-GB" i="1" dirty="0" err="1"/>
+              <a:t>Arctium</a:t>
+            </a:r>
+            <a:r>
+              <a:rPr lang="en-GB" i="1" dirty="0"/>
+              <a:t> intermedium</a:t>
+            </a:r>
+            <a:endParaRPr lang="en-GB" dirty="0"/>
+          </a:p>
+          <a:p>
+            <a:endParaRPr lang="en-GB" dirty="0"/>
+          </a:p>
+          <a:p>
+            <a:r>
+              <a:rPr lang="en-GB" dirty="0"/>
+              <a:t>In ‘single’ operation the first test checks if exact binomial match in POWO</a:t>
+            </a:r>
+          </a:p>
+          <a:p>
+            <a:r>
+              <a:rPr lang="en-GB" dirty="0"/>
+              <a:t>Then runs a fuzzy test using GBIF API – multiple results are sorted by relevance</a:t>
+            </a:r>
+          </a:p>
+          <a:p>
+            <a:r>
+              <a:rPr lang="en-GB" dirty="0"/>
+              <a:t>Results for POWO and GBIF (with authors) are presented to user, and user can choose best option </a:t>
+            </a:r>
+          </a:p>
+          <a:p>
+            <a:endParaRPr lang="en-GB" dirty="0"/>
+          </a:p>
+          <a:p>
+            <a:r>
+              <a:rPr lang="en-GB" dirty="0"/>
+              <a:t>In batch operation, we need to make an automatic selection. How best to do this?</a:t>
+            </a:r>
+          </a:p>
+          <a:p>
+            <a:endParaRPr lang="en-GB" dirty="0"/>
+          </a:p>
+          <a:p>
+            <a:endParaRPr lang="en-GB" dirty="0"/>
+          </a:p>
+        </p:txBody>
+      </p:sp>
     </p:spTree>
     <p:extLst>
       <p:ext uri="{BB962C8B-B14F-4D97-AF65-F5344CB8AC3E}">

</xml_diff>